<commit_message>
Updated Standards File and PowerPoint
</commit_message>
<xml_diff>
--- a/Venus Medical Research.pptx
+++ b/Venus Medical Research.pptx
@@ -113,7 +113,64 @@
       </a:defRPr>
     </a:lvl9pPr>
   </p:defaultTextStyle>
+  <p:extLst>
+    <p:ext uri="{EFAFB233-063F-42B5-8137-9DF3F51BA10A}">
+      <p15:sldGuideLst xmlns:p15="http://schemas.microsoft.com/office/powerpoint/2012/main"/>
+    </p:ext>
+  </p:extLst>
 </p:presentation>
+</file>
+
+<file path=ppt/changesInfos/changesInfo1.xml><?xml version="1.0" encoding="utf-8"?>
+<pc:chgInfo xmlns:a="http://schemas.openxmlformats.org/drawingml/2006/main" xmlns:r="http://schemas.openxmlformats.org/officeDocument/2006/relationships" xmlns:ac="http://schemas.microsoft.com/office/drawing/2013/main/command" xmlns:pc="http://schemas.microsoft.com/office/powerpoint/2013/main/command">
+  <pc:docChgLst>
+    <pc:chgData name="Stephen R" userId="805ae0111b03fc28" providerId="LiveId" clId="{4BE1FB4E-129C-4DC7-8846-1803156EE98E}"/>
+    <pc:docChg chg="custSel modSld">
+      <pc:chgData name="Stephen R" userId="805ae0111b03fc28" providerId="LiveId" clId="{4BE1FB4E-129C-4DC7-8846-1803156EE98E}" dt="2021-08-23T08:52:54.784" v="15" actId="1076"/>
+      <pc:docMkLst>
+        <pc:docMk/>
+      </pc:docMkLst>
+      <pc:sldChg chg="addSp delSp modSp mod">
+        <pc:chgData name="Stephen R" userId="805ae0111b03fc28" providerId="LiveId" clId="{4BE1FB4E-129C-4DC7-8846-1803156EE98E}" dt="2021-08-23T08:52:54.784" v="15" actId="1076"/>
+        <pc:sldMkLst>
+          <pc:docMk/>
+          <pc:sldMk cId="1145562694" sldId="258"/>
+        </pc:sldMkLst>
+        <pc:picChg chg="add mod">
+          <ac:chgData name="Stephen R" userId="805ae0111b03fc28" providerId="LiveId" clId="{4BE1FB4E-129C-4DC7-8846-1803156EE98E}" dt="2021-08-23T08:52:54.784" v="15" actId="1076"/>
+          <ac:picMkLst>
+            <pc:docMk/>
+            <pc:sldMk cId="1145562694" sldId="258"/>
+            <ac:picMk id="4" creationId="{F213D6F3-D4AC-44A9-9BA4-3B536475B36F}"/>
+          </ac:picMkLst>
+        </pc:picChg>
+        <pc:picChg chg="del">
+          <ac:chgData name="Stephen R" userId="805ae0111b03fc28" providerId="LiveId" clId="{4BE1FB4E-129C-4DC7-8846-1803156EE98E}" dt="2021-08-23T08:52:45.338" v="11" actId="478"/>
+          <ac:picMkLst>
+            <pc:docMk/>
+            <pc:sldMk cId="1145562694" sldId="258"/>
+            <ac:picMk id="13" creationId="{0E69F28E-05E1-4D57-83DB-7CA181E0CE3E}"/>
+          </ac:picMkLst>
+        </pc:picChg>
+      </pc:sldChg>
+      <pc:sldChg chg="modSp mod">
+        <pc:chgData name="Stephen R" userId="805ae0111b03fc28" providerId="LiveId" clId="{4BE1FB4E-129C-4DC7-8846-1803156EE98E}" dt="2021-08-23T08:51:58.253" v="9" actId="20577"/>
+        <pc:sldMkLst>
+          <pc:docMk/>
+          <pc:sldMk cId="144408727" sldId="260"/>
+        </pc:sldMkLst>
+        <pc:spChg chg="mod">
+          <ac:chgData name="Stephen R" userId="805ae0111b03fc28" providerId="LiveId" clId="{4BE1FB4E-129C-4DC7-8846-1803156EE98E}" dt="2021-08-23T08:51:58.253" v="9" actId="20577"/>
+          <ac:spMkLst>
+            <pc:docMk/>
+            <pc:sldMk cId="144408727" sldId="260"/>
+            <ac:spMk id="3" creationId="{FC25F0B6-87E7-47D0-A64E-DAA8FF41B785}"/>
+          </ac:spMkLst>
+        </pc:spChg>
+      </pc:sldChg>
+    </pc:docChg>
+  </pc:docChgLst>
+</pc:chgInfo>
 </file>
 
 <file path=ppt/slideLayouts/slideLayout1.xml><?xml version="1.0" encoding="utf-8"?>
@@ -265,7 +322,7 @@
           <a:p>
             <a:fld id="{CD76BAE6-A025-441C-B748-9ACB4585AC6C}" type="datetimeFigureOut">
               <a:rPr lang="en-GB" smtClean="0"/>
-              <a:t>22/08/2021</a:t>
+              <a:t>23/08/2021</a:t>
             </a:fld>
             <a:endParaRPr lang="en-GB"/>
           </a:p>
@@ -465,7 +522,7 @@
           <a:p>
             <a:fld id="{CD76BAE6-A025-441C-B748-9ACB4585AC6C}" type="datetimeFigureOut">
               <a:rPr lang="en-GB" smtClean="0"/>
-              <a:t>22/08/2021</a:t>
+              <a:t>23/08/2021</a:t>
             </a:fld>
             <a:endParaRPr lang="en-GB"/>
           </a:p>
@@ -675,7 +732,7 @@
           <a:p>
             <a:fld id="{CD76BAE6-A025-441C-B748-9ACB4585AC6C}" type="datetimeFigureOut">
               <a:rPr lang="en-GB" smtClean="0"/>
-              <a:t>22/08/2021</a:t>
+              <a:t>23/08/2021</a:t>
             </a:fld>
             <a:endParaRPr lang="en-GB"/>
           </a:p>
@@ -875,7 +932,7 @@
           <a:p>
             <a:fld id="{CD76BAE6-A025-441C-B748-9ACB4585AC6C}" type="datetimeFigureOut">
               <a:rPr lang="en-GB" smtClean="0"/>
-              <a:t>22/08/2021</a:t>
+              <a:t>23/08/2021</a:t>
             </a:fld>
             <a:endParaRPr lang="en-GB"/>
           </a:p>
@@ -1151,7 +1208,7 @@
           <a:p>
             <a:fld id="{CD76BAE6-A025-441C-B748-9ACB4585AC6C}" type="datetimeFigureOut">
               <a:rPr lang="en-GB" smtClean="0"/>
-              <a:t>22/08/2021</a:t>
+              <a:t>23/08/2021</a:t>
             </a:fld>
             <a:endParaRPr lang="en-GB"/>
           </a:p>
@@ -1419,7 +1476,7 @@
           <a:p>
             <a:fld id="{CD76BAE6-A025-441C-B748-9ACB4585AC6C}" type="datetimeFigureOut">
               <a:rPr lang="en-GB" smtClean="0"/>
-              <a:t>22/08/2021</a:t>
+              <a:t>23/08/2021</a:t>
             </a:fld>
             <a:endParaRPr lang="en-GB"/>
           </a:p>
@@ -1834,7 +1891,7 @@
           <a:p>
             <a:fld id="{CD76BAE6-A025-441C-B748-9ACB4585AC6C}" type="datetimeFigureOut">
               <a:rPr lang="en-GB" smtClean="0"/>
-              <a:t>22/08/2021</a:t>
+              <a:t>23/08/2021</a:t>
             </a:fld>
             <a:endParaRPr lang="en-GB"/>
           </a:p>
@@ -1976,7 +2033,7 @@
           <a:p>
             <a:fld id="{CD76BAE6-A025-441C-B748-9ACB4585AC6C}" type="datetimeFigureOut">
               <a:rPr lang="en-GB" smtClean="0"/>
-              <a:t>22/08/2021</a:t>
+              <a:t>23/08/2021</a:t>
             </a:fld>
             <a:endParaRPr lang="en-GB"/>
           </a:p>
@@ -2089,7 +2146,7 @@
           <a:p>
             <a:fld id="{CD76BAE6-A025-441C-B748-9ACB4585AC6C}" type="datetimeFigureOut">
               <a:rPr lang="en-GB" smtClean="0"/>
-              <a:t>22/08/2021</a:t>
+              <a:t>23/08/2021</a:t>
             </a:fld>
             <a:endParaRPr lang="en-GB"/>
           </a:p>
@@ -2402,7 +2459,7 @@
           <a:p>
             <a:fld id="{CD76BAE6-A025-441C-B748-9ACB4585AC6C}" type="datetimeFigureOut">
               <a:rPr lang="en-GB" smtClean="0"/>
-              <a:t>22/08/2021</a:t>
+              <a:t>23/08/2021</a:t>
             </a:fld>
             <a:endParaRPr lang="en-GB"/>
           </a:p>
@@ -2691,7 +2748,7 @@
           <a:p>
             <a:fld id="{CD76BAE6-A025-441C-B748-9ACB4585AC6C}" type="datetimeFigureOut">
               <a:rPr lang="en-GB" smtClean="0"/>
-              <a:t>22/08/2021</a:t>
+              <a:t>23/08/2021</a:t>
             </a:fld>
             <a:endParaRPr lang="en-GB"/>
           </a:p>
@@ -2934,7 +2991,7 @@
           <a:p>
             <a:fld id="{CD76BAE6-A025-441C-B748-9ACB4585AC6C}" type="datetimeFigureOut">
               <a:rPr lang="en-GB" smtClean="0"/>
-              <a:t>22/08/2021</a:t>
+              <a:t>23/08/2021</a:t>
             </a:fld>
             <a:endParaRPr lang="en-GB"/>
           </a:p>
@@ -3795,7 +3852,7 @@
           <a:p>
             <a:r>
               <a:rPr lang="en-GB" dirty="0"/>
-              <a:t>All filenames are in camel case</a:t>
+              <a:t>All filenames are in snake case</a:t>
             </a:r>
           </a:p>
           <a:p>
@@ -4060,10 +4117,10 @@
       </p:sp>
       <p:pic>
         <p:nvPicPr>
-          <p:cNvPr id="13" name="Picture 12">
-            <a:extLst>
-              <a:ext uri="{FF2B5EF4-FFF2-40B4-BE49-F238E27FC236}">
-                <a16:creationId xmlns:a16="http://schemas.microsoft.com/office/drawing/2014/main" id="{0E69F28E-05E1-4D57-83DB-7CA181E0CE3E}"/>
+          <p:cNvPr id="4" name="Picture 3">
+            <a:extLst>
+              <a:ext uri="{FF2B5EF4-FFF2-40B4-BE49-F238E27FC236}">
+                <a16:creationId xmlns:a16="http://schemas.microsoft.com/office/drawing/2014/main" id="{F213D6F3-D4AC-44A9-9BA4-3B536475B36F}"/>
               </a:ext>
             </a:extLst>
           </p:cNvPr>
@@ -4073,15 +4130,21 @@
           <p:nvPr/>
         </p:nvPicPr>
         <p:blipFill>
-          <a:blip r:embed="rId4"/>
+          <a:blip r:embed="rId4">
+            <a:extLst>
+              <a:ext uri="{28A0092B-C50C-407E-A947-70E740481C1C}">
+                <a14:useLocalDpi xmlns:a14="http://schemas.microsoft.com/office/drawing/2010/main" val="0"/>
+              </a:ext>
+            </a:extLst>
+          </a:blip>
           <a:stretch>
             <a:fillRect/>
           </a:stretch>
         </p:blipFill>
         <p:spPr>
           <a:xfrm>
-            <a:off x="6247438" y="1526780"/>
-            <a:ext cx="3924004" cy="2535706"/>
+            <a:off x="5057110" y="1526780"/>
+            <a:ext cx="6955232" cy="2226354"/>
           </a:xfrm>
           <a:prstGeom prst="rect">
             <a:avLst/>

</xml_diff>